<commit_message>
docs: corrigir slide 3 com imagem de IA expandida e layout otimizado
</commit_message>
<xml_diff>
--- a/Health_Army_Volunteers__Transformando_Tecnologia_em_Impacto_Social.pptx
+++ b/Health_Army_Volunteers__Transformando_Tecnologia_em_Impacto_Social.pptx
@@ -2239,7 +2239,7 @@
         </p:nvSpPr>
         <p:spPr>
           <a:xfrm>
-            <a:off x="571500" y="612577"/>
+            <a:off x="571500" y="469702"/>
             <a:ext cx="5051050" cy="466130"/>
           </a:xfrm>
           <a:prstGeom prst="rect">
@@ -2288,7 +2288,7 @@
         </p:blipFill>
         <p:spPr>
           <a:xfrm>
-            <a:off x="7429500" y="428625"/>
+            <a:off x="7429500" y="285750"/>
             <a:ext cx="1143000" cy="800100"/>
           </a:xfrm>
           <a:prstGeom prst="rect">
@@ -2304,8 +2304,8 @@
         </p:nvSpPr>
         <p:spPr>
           <a:xfrm>
-            <a:off x="571500" y="1934170"/>
-            <a:ext cx="2400300" cy="233958"/>
+            <a:off x="571500" y="1576983"/>
+            <a:ext cx="2400300" cy="214313"/>
           </a:xfrm>
           <a:prstGeom prst="rect">
             <a:avLst/>
@@ -2321,19 +2321,19 @@
           <a:p>
             <a:pPr algn="l" indent="0" marL="0">
               <a:lnSpc>
-                <a:spcPts val="1600"/>
-              </a:lnSpc>
-              <a:buNone/>
-            </a:pPr>
-            <a:r>
-              <a:rPr lang="en-US" sz="1193" b="1" dirty="0">
+                <a:spcPts val="1500"/>
+              </a:lnSpc>
+              <a:buNone/>
+            </a:pPr>
+            <a:r>
+              <a:rPr lang="en-US" sz="1090" b="1" dirty="0">
                 <a:solidFill>
                   <a:srgbClr val="0F172A"/>
                 </a:solidFill>
               </a:rPr>
               <a:t>Gestão de Voluntários</a:t>
             </a:r>
-            <a:endParaRPr lang="en-US" sz="1193" dirty="0"/>
+            <a:endParaRPr lang="en-US" sz="1090" dirty="0"/>
           </a:p>
         </p:txBody>
       </p:sp>
@@ -2345,8 +2345,8 @@
         </p:nvSpPr>
         <p:spPr>
           <a:xfrm>
-            <a:off x="571500" y="2311003"/>
-            <a:ext cx="2400300" cy="205718"/>
+            <a:off x="571500" y="1898452"/>
+            <a:ext cx="2400300" cy="169999"/>
           </a:xfrm>
           <a:prstGeom prst="rect">
             <a:avLst/>
@@ -2362,19 +2362,19 @@
           <a:p>
             <a:pPr algn="l" indent="0" marL="0">
               <a:lnSpc>
-                <a:spcPts val="1600"/>
-              </a:lnSpc>
-              <a:buNone/>
-            </a:pPr>
-            <a:r>
-              <a:rPr lang="en-US" sz="942" dirty="0">
+                <a:spcPts val="1300"/>
+              </a:lnSpc>
+              <a:buNone/>
+            </a:pPr>
+            <a:r>
+              <a:rPr lang="en-US" sz="888" dirty="0">
                 <a:solidFill>
                   <a:srgbClr val="334155"/>
                 </a:solidFill>
               </a:rPr>
               <a:t>Cadastro simplificado</a:t>
             </a:r>
-            <a:endParaRPr lang="en-US" sz="942" dirty="0"/>
+            <a:endParaRPr lang="en-US" sz="888" dirty="0"/>
           </a:p>
         </p:txBody>
       </p:sp>
@@ -2386,8 +2386,8 @@
         </p:nvSpPr>
         <p:spPr>
           <a:xfrm>
-            <a:off x="571500" y="2602446"/>
-            <a:ext cx="2400300" cy="205718"/>
+            <a:off x="571500" y="2125600"/>
+            <a:ext cx="2400300" cy="169999"/>
           </a:xfrm>
           <a:prstGeom prst="rect">
             <a:avLst/>
@@ -2403,19 +2403,19 @@
           <a:p>
             <a:pPr algn="l" indent="0" marL="0">
               <a:lnSpc>
-                <a:spcPts val="1600"/>
-              </a:lnSpc>
-              <a:buNone/>
-            </a:pPr>
-            <a:r>
-              <a:rPr lang="en-US" sz="942" dirty="0">
+                <a:spcPts val="1300"/>
+              </a:lnSpc>
+              <a:buNone/>
+            </a:pPr>
+            <a:r>
+              <a:rPr lang="en-US" sz="888" dirty="0">
                 <a:solidFill>
                   <a:srgbClr val="334155"/>
                 </a:solidFill>
               </a:rPr>
               <a:t>Edição detalhada de dados</a:t>
             </a:r>
-            <a:endParaRPr lang="en-US" sz="942" dirty="0"/>
+            <a:endParaRPr lang="en-US" sz="888" dirty="0"/>
           </a:p>
         </p:txBody>
       </p:sp>
@@ -2427,8 +2427,8 @@
         </p:nvSpPr>
         <p:spPr>
           <a:xfrm>
-            <a:off x="571500" y="2893888"/>
-            <a:ext cx="2400300" cy="205718"/>
+            <a:off x="571500" y="2352749"/>
+            <a:ext cx="2400300" cy="169999"/>
           </a:xfrm>
           <a:prstGeom prst="rect">
             <a:avLst/>
@@ -2444,19 +2444,19 @@
           <a:p>
             <a:pPr algn="l" indent="0" marL="0">
               <a:lnSpc>
-                <a:spcPts val="1600"/>
-              </a:lnSpc>
-              <a:buNone/>
-            </a:pPr>
-            <a:r>
-              <a:rPr lang="en-US" sz="942" dirty="0">
+                <a:spcPts val="1300"/>
+              </a:lnSpc>
+              <a:buNone/>
+            </a:pPr>
+            <a:r>
+              <a:rPr lang="en-US" sz="888" dirty="0">
                 <a:solidFill>
                   <a:srgbClr val="334155"/>
                 </a:solidFill>
               </a:rPr>
               <a:t>Painel administrativo central</a:t>
             </a:r>
-            <a:endParaRPr lang="en-US" sz="942" dirty="0"/>
+            <a:endParaRPr lang="en-US" sz="888" dirty="0"/>
           </a:p>
         </p:txBody>
       </p:sp>
@@ -2468,8 +2468,8 @@
         </p:nvSpPr>
         <p:spPr>
           <a:xfrm>
-            <a:off x="3371850" y="1934170"/>
-            <a:ext cx="2400300" cy="233958"/>
+            <a:off x="3371850" y="1576983"/>
+            <a:ext cx="2400300" cy="214313"/>
           </a:xfrm>
           <a:prstGeom prst="rect">
             <a:avLst/>
@@ -2485,19 +2485,19 @@
           <a:p>
             <a:pPr algn="l" indent="0" marL="0">
               <a:lnSpc>
-                <a:spcPts val="1600"/>
-              </a:lnSpc>
-              <a:buNone/>
-            </a:pPr>
-            <a:r>
-              <a:rPr lang="en-US" sz="1193" b="1" dirty="0">
+                <a:spcPts val="1500"/>
+              </a:lnSpc>
+              <a:buNone/>
+            </a:pPr>
+            <a:r>
+              <a:rPr lang="en-US" sz="1090" b="1" dirty="0">
                 <a:solidFill>
                   <a:srgbClr val="059669"/>
                 </a:solidFill>
               </a:rPr>
               <a:t>Agenda Flexível</a:t>
             </a:r>
-            <a:endParaRPr lang="en-US" sz="1193" dirty="0"/>
+            <a:endParaRPr lang="en-US" sz="1090" dirty="0"/>
           </a:p>
         </p:txBody>
       </p:sp>
@@ -2509,8 +2509,8 @@
         </p:nvSpPr>
         <p:spPr>
           <a:xfrm>
-            <a:off x="3371850" y="2311003"/>
-            <a:ext cx="2400300" cy="205718"/>
+            <a:off x="3371850" y="1898452"/>
+            <a:ext cx="2400300" cy="169999"/>
           </a:xfrm>
           <a:prstGeom prst="rect">
             <a:avLst/>
@@ -2526,19 +2526,19 @@
           <a:p>
             <a:pPr algn="l" indent="0" marL="0">
               <a:lnSpc>
-                <a:spcPts val="1600"/>
-              </a:lnSpc>
-              <a:buNone/>
-            </a:pPr>
-            <a:r>
-              <a:rPr lang="en-US" sz="942" dirty="0">
+                <a:spcPts val="1300"/>
+              </a:lnSpc>
+              <a:buNone/>
+            </a:pPr>
+            <a:r>
+              <a:rPr lang="en-US" sz="888" dirty="0">
                 <a:solidFill>
                   <a:srgbClr val="334155"/>
                 </a:solidFill>
               </a:rPr>
               <a:t>Múltiplos dias da semana</a:t>
             </a:r>
-            <a:endParaRPr lang="en-US" sz="942" dirty="0"/>
+            <a:endParaRPr lang="en-US" sz="888" dirty="0"/>
           </a:p>
         </p:txBody>
       </p:sp>
@@ -2550,8 +2550,8 @@
         </p:nvSpPr>
         <p:spPr>
           <a:xfrm>
-            <a:off x="3371850" y="2602446"/>
-            <a:ext cx="2400300" cy="205718"/>
+            <a:off x="3371850" y="2125600"/>
+            <a:ext cx="2400300" cy="169999"/>
           </a:xfrm>
           <a:prstGeom prst="rect">
             <a:avLst/>
@@ -2567,19 +2567,19 @@
           <a:p>
             <a:pPr algn="l" indent="0" marL="0">
               <a:lnSpc>
-                <a:spcPts val="1600"/>
-              </a:lnSpc>
-              <a:buNone/>
-            </a:pPr>
-            <a:r>
-              <a:rPr lang="en-US" sz="942" dirty="0">
+                <a:spcPts val="1300"/>
+              </a:lnSpc>
+              <a:buNone/>
+            </a:pPr>
+            <a:r>
+              <a:rPr lang="en-US" sz="888" dirty="0">
                 <a:solidFill>
                   <a:srgbClr val="334155"/>
                 </a:solidFill>
               </a:rPr>
               <a:t>Janelas de tempo ajustáveis</a:t>
             </a:r>
-            <a:endParaRPr lang="en-US" sz="942" dirty="0"/>
+            <a:endParaRPr lang="en-US" sz="888" dirty="0"/>
           </a:p>
         </p:txBody>
       </p:sp>
@@ -2591,8 +2591,8 @@
         </p:nvSpPr>
         <p:spPr>
           <a:xfrm>
-            <a:off x="3371850" y="2893888"/>
-            <a:ext cx="2400300" cy="205718"/>
+            <a:off x="3371850" y="2352749"/>
+            <a:ext cx="2400300" cy="169999"/>
           </a:xfrm>
           <a:prstGeom prst="rect">
             <a:avLst/>
@@ -2608,19 +2608,19 @@
           <a:p>
             <a:pPr algn="l" indent="0" marL="0">
               <a:lnSpc>
-                <a:spcPts val="1600"/>
-              </a:lnSpc>
-              <a:buNone/>
-            </a:pPr>
-            <a:r>
-              <a:rPr lang="en-US" sz="942" dirty="0">
+                <a:spcPts val="1300"/>
+              </a:lnSpc>
+              <a:buNone/>
+            </a:pPr>
+            <a:r>
+              <a:rPr lang="en-US" sz="888" dirty="0">
                 <a:solidFill>
                   <a:srgbClr val="334155"/>
                 </a:solidFill>
               </a:rPr>
               <a:t>Ajuste em tempo real</a:t>
             </a:r>
-            <a:endParaRPr lang="en-US" sz="942" dirty="0"/>
+            <a:endParaRPr lang="en-US" sz="888" dirty="0"/>
           </a:p>
         </p:txBody>
       </p:sp>
@@ -2632,8 +2632,8 @@
         </p:nvSpPr>
         <p:spPr>
           <a:xfrm>
-            <a:off x="6172200" y="1934170"/>
-            <a:ext cx="2400300" cy="233958"/>
+            <a:off x="6172200" y="1576983"/>
+            <a:ext cx="2400300" cy="214313"/>
           </a:xfrm>
           <a:prstGeom prst="rect">
             <a:avLst/>
@@ -2649,19 +2649,19 @@
           <a:p>
             <a:pPr algn="l" indent="0" marL="0">
               <a:lnSpc>
-                <a:spcPts val="1600"/>
-              </a:lnSpc>
-              <a:buNone/>
-            </a:pPr>
-            <a:r>
-              <a:rPr lang="en-US" sz="1193" b="1" dirty="0">
+                <a:spcPts val="1500"/>
+              </a:lnSpc>
+              <a:buNone/>
+            </a:pPr>
+            <a:r>
+              <a:rPr lang="en-US" sz="1090" b="1" dirty="0">
                 <a:solidFill>
                   <a:srgbClr val="0F172A"/>
                 </a:solidFill>
               </a:rPr>
               <a:t>Qualidade &amp; Dados</a:t>
             </a:r>
-            <a:endParaRPr lang="en-US" sz="1193" dirty="0"/>
+            <a:endParaRPr lang="en-US" sz="1090" dirty="0"/>
           </a:p>
         </p:txBody>
       </p:sp>
@@ -2673,8 +2673,8 @@
         </p:nvSpPr>
         <p:spPr>
           <a:xfrm>
-            <a:off x="6172200" y="2311003"/>
-            <a:ext cx="2400300" cy="205718"/>
+            <a:off x="6172200" y="1898452"/>
+            <a:ext cx="2400300" cy="169999"/>
           </a:xfrm>
           <a:prstGeom prst="rect">
             <a:avLst/>
@@ -2690,19 +2690,19 @@
           <a:p>
             <a:pPr algn="l" indent="0" marL="0">
               <a:lnSpc>
-                <a:spcPts val="1600"/>
-              </a:lnSpc>
-              <a:buNone/>
-            </a:pPr>
-            <a:r>
-              <a:rPr lang="en-US" sz="942" dirty="0">
+                <a:spcPts val="1300"/>
+              </a:lnSpc>
+              <a:buNone/>
+            </a:pPr>
+            <a:r>
+              <a:rPr lang="en-US" sz="888" dirty="0">
                 <a:solidFill>
                   <a:srgbClr val="334155"/>
                 </a:solidFill>
               </a:rPr>
               <a:t>Validação em duas camadas</a:t>
             </a:r>
-            <a:endParaRPr lang="en-US" sz="942" dirty="0"/>
+            <a:endParaRPr lang="en-US" sz="888" dirty="0"/>
           </a:p>
         </p:txBody>
       </p:sp>
@@ -2714,8 +2714,8 @@
         </p:nvSpPr>
         <p:spPr>
           <a:xfrm>
-            <a:off x="6172200" y="2602446"/>
-            <a:ext cx="2400300" cy="205718"/>
+            <a:off x="6172200" y="2125600"/>
+            <a:ext cx="2400300" cy="169999"/>
           </a:xfrm>
           <a:prstGeom prst="rect">
             <a:avLst/>
@@ -2731,19 +2731,19 @@
           <a:p>
             <a:pPr algn="l" indent="0" marL="0">
               <a:lnSpc>
-                <a:spcPts val="1600"/>
-              </a:lnSpc>
-              <a:buNone/>
-            </a:pPr>
-            <a:r>
-              <a:rPr lang="en-US" sz="942" dirty="0">
+                <a:spcPts val="1300"/>
+              </a:lnSpc>
+              <a:buNone/>
+            </a:pPr>
+            <a:r>
+              <a:rPr lang="en-US" sz="888" dirty="0">
                 <a:solidFill>
                   <a:srgbClr val="334155"/>
                 </a:solidFill>
               </a:rPr>
               <a:t>Integridade de informações</a:t>
             </a:r>
-            <a:endParaRPr lang="en-US" sz="942" dirty="0"/>
+            <a:endParaRPr lang="en-US" sz="888" dirty="0"/>
           </a:p>
         </p:txBody>
       </p:sp>
@@ -2755,8 +2755,8 @@
         </p:nvSpPr>
         <p:spPr>
           <a:xfrm>
-            <a:off x="6172200" y="2893888"/>
-            <a:ext cx="2400300" cy="205718"/>
+            <a:off x="6172200" y="2352749"/>
+            <a:ext cx="2400300" cy="169999"/>
           </a:xfrm>
           <a:prstGeom prst="rect">
             <a:avLst/>
@@ -2772,25 +2772,65 @@
           <a:p>
             <a:pPr algn="l" indent="0" marL="0">
               <a:lnSpc>
-                <a:spcPts val="1600"/>
-              </a:lnSpc>
-              <a:buNone/>
-            </a:pPr>
-            <a:r>
-              <a:rPr lang="en-US" sz="942" dirty="0">
+                <a:spcPts val="1300"/>
+              </a:lnSpc>
+              <a:buNone/>
+            </a:pPr>
+            <a:r>
+              <a:rPr lang="en-US" sz="888" dirty="0">
                 <a:solidFill>
                   <a:srgbClr val="334155"/>
                 </a:solidFill>
               </a:rPr>
               <a:t>Redução de carga cognitiva</a:t>
             </a:r>
-            <a:endParaRPr lang="en-US" sz="942" dirty="0"/>
-          </a:p>
-        </p:txBody>
+            <a:endParaRPr lang="en-US" sz="888" dirty="0"/>
+          </a:p>
+        </p:txBody>
+      </p:sp>
+      <p:sp>
+        <p:nvSpPr>
+          <p:cNvPr id="17" name="Shape 13"/>
+          <p:cNvSpPr/>
+          <p:nvPr/>
+        </p:nvSpPr>
+        <p:spPr>
+          <a:xfrm>
+            <a:off x="0" y="2794211"/>
+            <a:ext cx="9144000" cy="2286000"/>
+          </a:xfrm>
+          <a:prstGeom prst="rect">
+            <a:avLst/>
+          </a:prstGeom>
+          <a:solidFill>
+            <a:srgbClr val="F8FAFC"/>
+          </a:solidFill>
+          <a:ln/>
+        </p:spPr>
+      </p:sp>
+      <p:sp>
+        <p:nvSpPr>
+          <p:cNvPr id="18" name="Shape 14"/>
+          <p:cNvSpPr/>
+          <p:nvPr/>
+        </p:nvSpPr>
+        <p:spPr>
+          <a:xfrm>
+            <a:off x="0" y="2794211"/>
+            <a:ext cx="9144000" cy="7144"/>
+          </a:xfrm>
+          <a:prstGeom prst="rect">
+            <a:avLst/>
+          </a:prstGeom>
+          <a:solidFill>
+            <a:srgbClr val="E2E8F0"/>
+          </a:solidFill>
+          <a:ln/>
+        </p:spPr>
       </p:sp>
       <p:pic>
         <p:nvPicPr>
-          <p:cNvPr id="17" name="Image 2" descr="preencoded.png">    </p:cNvPr>
+          <p:cNvPr id="19" name="Image 2" descr="preencoded.png">    </p:cNvPr>
           <p:cNvPicPr>
             <a:picLocks noChangeAspect="1"/>
           </p:cNvPicPr>
@@ -2804,8 +2844,8 @@
         </p:blipFill>
         <p:spPr>
           <a:xfrm>
-            <a:off x="4071938" y="3613956"/>
-            <a:ext cx="1000125" cy="1000125"/>
+            <a:off x="1000125" y="2794211"/>
+            <a:ext cx="7143750" cy="2286000"/>
           </a:xfrm>
           <a:prstGeom prst="rect">
             <a:avLst/>

</xml_diff>